<commit_message>
[docs] edit 낙훈 introduce upload
S04P31A201-63
</commit_message>
<xml_diff>
--- a/docs/Introduce/SDS_자기소개_최낙훈.pptx
+++ b/docs/Introduce/SDS_자기소개_최낙훈.pptx
@@ -5098,7 +5098,7 @@
         </p:nvSpPr>
         <p:spPr>
           <a:xfrm>
-            <a:off x="1025233" y="3168661"/>
+            <a:off x="1025234" y="3170081"/>
             <a:ext cx="2043172" cy="429491"/>
           </a:xfrm>
           <a:prstGeom prst="roundRect">
@@ -5214,19 +5214,23 @@
           <a:p>
             <a:r>
               <a:rPr lang="ko-KR" altLang="en-US" dirty="0" smtClean="0"/>
-              <a:t>컴퓨터공학부 </a:t>
+              <a:t>컴퓨터공학부</a:t>
             </a:r>
             <a:r>
               <a:rPr lang="en-US" altLang="ko-KR" dirty="0" smtClean="0"/>
-              <a:t>– </a:t>
+              <a:t>(SSAFY </a:t>
             </a:r>
             <a:r>
               <a:rPr lang="ko-KR" altLang="en-US" dirty="0" err="1" smtClean="0"/>
-              <a:t>웹서버</a:t>
+              <a:t>전공자반</a:t>
             </a:r>
             <a:r>
               <a:rPr lang="ko-KR" altLang="en-US" dirty="0" smtClean="0"/>
-              <a:t> 개발 커리큘럼</a:t>
+              <a:t> 이수</a:t>
+            </a:r>
+            <a:r>
+              <a:rPr lang="en-US" altLang="ko-KR" dirty="0" smtClean="0"/>
+              <a:t>)</a:t>
             </a:r>
             <a:endParaRPr lang="ko-KR" altLang="en-US" dirty="0"/>
           </a:p>
@@ -5415,15 +5419,7 @@
           <a:p>
             <a:r>
               <a:rPr lang="ko-KR" altLang="en-US" dirty="0" smtClean="0"/>
-              <a:t>공통 </a:t>
-            </a:r>
-            <a:r>
-              <a:rPr lang="ko-KR" altLang="en-US" dirty="0" smtClean="0"/>
-              <a:t>프로젝트 </a:t>
-            </a:r>
-            <a:r>
-              <a:rPr lang="ko-KR" altLang="en-US" dirty="0" smtClean="0"/>
-              <a:t>소개</a:t>
+              <a:t>공통 프로젝트 소개</a:t>
             </a:r>
             <a:endParaRPr lang="ko-KR" altLang="en-US" dirty="0"/>
           </a:p>
@@ -5481,56 +5477,6 @@
       </p:sp>
       <p:sp>
         <p:nvSpPr>
-          <p:cNvPr id="21" name="모서리가 둥근 직사각형 20"/>
-          <p:cNvSpPr/>
-          <p:nvPr/>
-        </p:nvSpPr>
-        <p:spPr>
-          <a:xfrm>
-            <a:off x="1021359" y="2524781"/>
-            <a:ext cx="1884219" cy="429491"/>
-          </a:xfrm>
-          <a:prstGeom prst="roundRect">
-            <a:avLst/>
-          </a:prstGeom>
-          <a:solidFill>
-            <a:srgbClr val="00B050"/>
-          </a:solidFill>
-          <a:ln>
-            <a:noFill/>
-          </a:ln>
-        </p:spPr>
-        <p:style>
-          <a:lnRef idx="2">
-            <a:schemeClr val="accent1">
-              <a:shade val="50000"/>
-            </a:schemeClr>
-          </a:lnRef>
-          <a:fillRef idx="1">
-            <a:schemeClr val="accent1"/>
-          </a:fillRef>
-          <a:effectRef idx="0">
-            <a:schemeClr val="accent1"/>
-          </a:effectRef>
-          <a:fontRef idx="minor">
-            <a:schemeClr val="lt1"/>
-          </a:fontRef>
-        </p:style>
-        <p:txBody>
-          <a:bodyPr rtlCol="0" anchor="ctr"/>
-          <a:lstStyle/>
-          <a:p>
-            <a:pPr algn="ctr"/>
-            <a:r>
-              <a:rPr lang="ko-KR" altLang="en-US" sz="1600" b="1" dirty="0" smtClean="0"/>
-              <a:t>기술 스택</a:t>
-            </a:r>
-            <a:endParaRPr lang="ko-KR" altLang="en-US" sz="1600" b="1" dirty="0"/>
-          </a:p>
-        </p:txBody>
-      </p:sp>
-      <p:sp>
-        <p:nvSpPr>
           <p:cNvPr id="40" name="모서리가 둥근 직사각형 39"/>
           <p:cNvSpPr/>
           <p:nvPr/>
@@ -5719,7 +5665,7 @@
         </p:blipFill>
         <p:spPr>
           <a:xfrm>
-            <a:off x="7444680" y="1681426"/>
+            <a:off x="7731625" y="1934726"/>
             <a:ext cx="3745096" cy="2009237"/>
           </a:xfrm>
           <a:prstGeom prst="rect">
@@ -5727,30 +5673,6 @@
           </a:prstGeom>
         </p:spPr>
       </p:pic>
-      <p:pic>
-        <p:nvPicPr>
-          <p:cNvPr id="9" name="그림 8"/>
-          <p:cNvPicPr>
-            <a:picLocks noChangeAspect="1"/>
-          </p:cNvPicPr>
-          <p:nvPr/>
-        </p:nvPicPr>
-        <p:blipFill>
-          <a:blip r:embed="rId4"/>
-          <a:stretch>
-            <a:fillRect/>
-          </a:stretch>
-        </p:blipFill>
-        <p:spPr>
-          <a:xfrm>
-            <a:off x="3478562" y="2398646"/>
-            <a:ext cx="2699745" cy="1642502"/>
-          </a:xfrm>
-          <a:prstGeom prst="rect">
-            <a:avLst/>
-          </a:prstGeom>
-        </p:spPr>
-      </p:pic>
       <p:sp>
         <p:nvSpPr>
           <p:cNvPr id="12" name="모서리가 둥근 직사각형 11"/>
@@ -5759,7 +5681,7 @@
         </p:nvSpPr>
         <p:spPr>
           <a:xfrm>
-            <a:off x="1021359" y="5710754"/>
+            <a:off x="1021359" y="2823205"/>
             <a:ext cx="1884219" cy="429491"/>
           </a:xfrm>
           <a:prstGeom prst="roundRect">
@@ -5809,8 +5731,8 @@
         </p:nvSpPr>
         <p:spPr>
           <a:xfrm>
-            <a:off x="3083660" y="5712089"/>
-            <a:ext cx="6471045" cy="646331"/>
+            <a:off x="3171045" y="2823205"/>
+            <a:ext cx="4040243" cy="923330"/>
           </a:xfrm>
           <a:prstGeom prst="rect">
             <a:avLst/>
@@ -5837,27 +5759,43 @@
             </a:r>
             <a:r>
               <a:rPr lang="ko-KR" altLang="en-US" dirty="0" smtClean="0"/>
-              <a:t> 빌드</a:t>
+              <a:t> </a:t>
+            </a:r>
+            <a:r>
+              <a:rPr lang="ko-KR" altLang="en-US" dirty="0" smtClean="0"/>
+              <a:t>빌드</a:t>
+            </a:r>
+            <a:r>
+              <a:rPr lang="ko-KR" altLang="en-US" dirty="0"/>
+              <a:t> </a:t>
+            </a:r>
+            <a:r>
+              <a:rPr lang="ko-KR" altLang="en-US" dirty="0" smtClean="0"/>
+              <a:t>후</a:t>
+            </a:r>
+            <a:r>
+              <a:rPr lang="en-US" altLang="ko-KR" dirty="0" smtClean="0"/>
+              <a:t> </a:t>
+            </a:r>
+            <a:r>
+              <a:rPr lang="ko-KR" altLang="en-US" dirty="0" smtClean="0"/>
+              <a:t>앱스토어 배포</a:t>
             </a:r>
             <a:r>
               <a:rPr lang="en-US" altLang="ko-KR" dirty="0" smtClean="0"/>
               <a:t>, </a:t>
             </a:r>
             <a:r>
+              <a:rPr lang="en-US" altLang="ko-KR" dirty="0" smtClean="0"/>
+              <a:t>Spring Web </a:t>
+            </a:r>
+            <a:r>
               <a:rPr lang="ko-KR" altLang="en-US" dirty="0" smtClean="0"/>
-              <a:t>앱스토어 배포</a:t>
-            </a:r>
-            <a:r>
-              <a:rPr lang="en-US" altLang="ko-KR" dirty="0" smtClean="0"/>
-              <a:t>, </a:t>
-            </a:r>
-            <a:r>
-              <a:rPr lang="ko-KR" altLang="en-US" dirty="0" err="1" smtClean="0"/>
-              <a:t>웹서버</a:t>
+              <a:t>서버 </a:t>
             </a:r>
             <a:r>
               <a:rPr lang="ko-KR" altLang="en-US" dirty="0" smtClean="0"/>
-              <a:t> 구축</a:t>
+              <a:t>구축</a:t>
             </a:r>
             <a:r>
               <a:rPr lang="en-US" altLang="ko-KR" dirty="0" smtClean="0"/>
@@ -6034,13 +5972,13 @@
       </p:sp>
       <p:sp>
         <p:nvSpPr>
-          <p:cNvPr id="10" name="모서리가 둥근 직사각형 9"/>
+          <p:cNvPr id="11" name="모서리가 둥근 직사각형 10"/>
           <p:cNvSpPr/>
           <p:nvPr/>
         </p:nvSpPr>
         <p:spPr>
           <a:xfrm>
-            <a:off x="1021359" y="2524781"/>
+            <a:off x="1021357" y="2780265"/>
             <a:ext cx="1884219" cy="429491"/>
           </a:xfrm>
           <a:prstGeom prst="roundRect">
@@ -6076,7 +6014,7 @@
             <a:pPr algn="ctr"/>
             <a:r>
               <a:rPr lang="ko-KR" altLang="en-US" sz="1600" b="1" dirty="0" smtClean="0"/>
-              <a:t>기술 스택</a:t>
+              <a:t>역할</a:t>
             </a:r>
             <a:endParaRPr lang="ko-KR" altLang="en-US" sz="1600" b="1" dirty="0"/>
           </a:p>
@@ -6084,13 +6022,13 @@
       </p:sp>
       <p:sp>
         <p:nvSpPr>
-          <p:cNvPr id="11" name="모서리가 둥근 직사각형 10"/>
+          <p:cNvPr id="12" name="모서리가 둥근 직사각형 11"/>
           <p:cNvSpPr/>
           <p:nvPr/>
         </p:nvSpPr>
         <p:spPr>
           <a:xfrm>
-            <a:off x="1052357" y="4592501"/>
+            <a:off x="1021357" y="4688520"/>
             <a:ext cx="1884219" cy="429491"/>
           </a:xfrm>
           <a:prstGeom prst="roundRect">
@@ -6126,103 +6064,12 @@
             <a:pPr algn="ctr"/>
             <a:r>
               <a:rPr lang="ko-KR" altLang="en-US" sz="1600" b="1" dirty="0" smtClean="0"/>
-              <a:t>역할</a:t>
+              <a:t>성과</a:t>
             </a:r>
             <a:endParaRPr lang="ko-KR" altLang="en-US" sz="1600" b="1" dirty="0"/>
           </a:p>
         </p:txBody>
       </p:sp>
-      <p:sp>
-        <p:nvSpPr>
-          <p:cNvPr id="12" name="모서리가 둥근 직사각형 11"/>
-          <p:cNvSpPr/>
-          <p:nvPr/>
-        </p:nvSpPr>
-        <p:spPr>
-          <a:xfrm>
-            <a:off x="1052357" y="5210933"/>
-            <a:ext cx="1884219" cy="429491"/>
-          </a:xfrm>
-          <a:prstGeom prst="roundRect">
-            <a:avLst/>
-          </a:prstGeom>
-          <a:solidFill>
-            <a:srgbClr val="00B050"/>
-          </a:solidFill>
-          <a:ln>
-            <a:noFill/>
-          </a:ln>
-        </p:spPr>
-        <p:style>
-          <a:lnRef idx="2">
-            <a:schemeClr val="accent1">
-              <a:shade val="50000"/>
-            </a:schemeClr>
-          </a:lnRef>
-          <a:fillRef idx="1">
-            <a:schemeClr val="accent1"/>
-          </a:fillRef>
-          <a:effectRef idx="0">
-            <a:schemeClr val="accent1"/>
-          </a:effectRef>
-          <a:fontRef idx="minor">
-            <a:schemeClr val="lt1"/>
-          </a:fontRef>
-        </p:style>
-        <p:txBody>
-          <a:bodyPr rtlCol="0" anchor="ctr"/>
-          <a:lstStyle/>
-          <a:p>
-            <a:pPr algn="ctr"/>
-            <a:r>
-              <a:rPr lang="ko-KR" altLang="en-US" sz="1600" b="1" dirty="0" smtClean="0"/>
-              <a:t>성과</a:t>
-            </a:r>
-            <a:endParaRPr lang="ko-KR" altLang="en-US" sz="1600" b="1" dirty="0"/>
-          </a:p>
-        </p:txBody>
-      </p:sp>
-      <p:pic>
-        <p:nvPicPr>
-          <p:cNvPr id="1026" name="Picture 2" descr="https://cdn.discordapp.com/attachments/821553873743249428/829659864418091048/unknown.png"/>
-          <p:cNvPicPr>
-            <a:picLocks noChangeAspect="1" noChangeArrowheads="1"/>
-          </p:cNvPicPr>
-          <p:nvPr/>
-        </p:nvPicPr>
-        <p:blipFill>
-          <a:blip r:embed="rId3" cstate="print">
-            <a:extLst>
-              <a:ext uri="{28A0092B-C50C-407E-A947-70E740481C1C}">
-                <a14:useLocalDpi xmlns:a14="http://schemas.microsoft.com/office/drawing/2010/main" val="0"/>
-              </a:ext>
-            </a:extLst>
-          </a:blip>
-          <a:srcRect/>
-          <a:stretch>
-            <a:fillRect/>
-          </a:stretch>
-        </p:blipFill>
-        <p:spPr bwMode="auto">
-          <a:xfrm>
-            <a:off x="3057041" y="2431791"/>
-            <a:ext cx="4100268" cy="2067927"/>
-          </a:xfrm>
-          <a:prstGeom prst="rect">
-            <a:avLst/>
-          </a:prstGeom>
-          <a:noFill/>
-          <a:extLst>
-            <a:ext uri="{909E8E84-426E-40DD-AFC4-6F175D3DCCD1}">
-              <a14:hiddenFill xmlns:a14="http://schemas.microsoft.com/office/drawing/2010/main">
-                <a:solidFill>
-                  <a:srgbClr val="FFFFFF"/>
-                </a:solidFill>
-              </a14:hiddenFill>
-            </a:ext>
-          </a:extLst>
-        </p:spPr>
-      </p:pic>
       <p:pic>
         <p:nvPicPr>
           <p:cNvPr id="5" name="그림 4"/>
@@ -6232,7 +6079,7 @@
           <p:nvPr/>
         </p:nvPicPr>
         <p:blipFill>
-          <a:blip r:embed="rId4"/>
+          <a:blip r:embed="rId3"/>
           <a:stretch>
             <a:fillRect/>
           </a:stretch>
@@ -6255,8 +6102,8 @@
         </p:nvSpPr>
         <p:spPr>
           <a:xfrm>
-            <a:off x="3057041" y="4622580"/>
-            <a:ext cx="7315200" cy="369332"/>
+            <a:off x="3057040" y="2748091"/>
+            <a:ext cx="3783742" cy="923330"/>
           </a:xfrm>
           <a:prstGeom prst="rect">
             <a:avLst/>
@@ -6313,7 +6160,7 @@
         </p:nvSpPr>
         <p:spPr>
           <a:xfrm>
-            <a:off x="3057040" y="5210933"/>
+            <a:off x="3057040" y="4643497"/>
             <a:ext cx="6865749" cy="923330"/>
           </a:xfrm>
           <a:prstGeom prst="rect">
@@ -6373,6 +6220,14 @@
               <a:buFontTx/>
               <a:buChar char="-"/>
             </a:pPr>
+            <a:r>
+              <a:rPr lang="ko-KR" altLang="en-US" dirty="0" err="1" smtClean="0"/>
+              <a:t>백엔드</a:t>
+            </a:r>
+            <a:r>
+              <a:rPr lang="ko-KR" altLang="en-US" dirty="0" smtClean="0"/>
+              <a:t> 역량을 늘리기 위해 </a:t>
+            </a:r>
             <a:r>
               <a:rPr lang="en-US" altLang="ko-KR" dirty="0" smtClean="0"/>
               <a:t>Django </a:t>

</xml_diff>